<commit_message>
converted ppt to reveal.js
</commit_message>
<xml_diff>
--- a/Day 1/Day 1.pptx
+++ b/Day 1/Day 1.pptx
@@ -181,7 +181,7 @@
       </p14:sectionLst>
     </p:ext>
     <p:ext uri="{EFAFB233-063F-42B5-8137-9DF3F51BA10A}">
-      <p15:sldGuideLst xmlns:p15="http://schemas.microsoft.com/office/powerpoint/2012/main" xmlns="">
+      <p15:sldGuideLst xmlns="" xmlns:p15="http://schemas.microsoft.com/office/powerpoint/2012/main">
         <p15:guide id="1" orient="horz" pos="4579" userDrawn="1">
           <p15:clr>
             <a:srgbClr val="A4A3A4"/>
@@ -245,7 +245,7 @@
       </p15:sldGuideLst>
     </p:ext>
     <p:ext uri="{2D200454-40CA-4A62-9FC3-DE9A4176ACB9}">
-      <p15:notesGuideLst xmlns:p15="http://schemas.microsoft.com/office/powerpoint/2012/main" xmlns="">
+      <p15:notesGuideLst xmlns="" xmlns:p15="http://schemas.microsoft.com/office/powerpoint/2012/main">
         <p15:guide id="1" orient="horz" pos="2923">
           <p15:clr>
             <a:srgbClr val="A4A3A4"/>
@@ -259,7 +259,7 @@
       </p15:notesGuideLst>
     </p:ext>
     <p:ext uri="{50385BFA-195E-4E9F-9E8A-86900EEC6D5D}">
-      <p14:sectionPr xmlns:p14="http://schemas.microsoft.com/office/powerpoint/2007/7/12/main" xmlns="">
+      <p14:sectionPr xmlns="" xmlns:p14="http://schemas.microsoft.com/office/powerpoint/2007/7/12/main">
         <p14:section name="Default Section" slideIdLst="263 258" id="{F3A50AD0-1C96-4FFB-A588-4C2E07833EC5}"/>
         <p14:section name="Untitled Section" slideIdLst="259 260" id="{731A7D92-B090-44AE-BDF3-5EDBB7844CCD}"/>
         <p14:section name="Untitled Section" slideIdLst="261 262" id="{8A1131A8-562D-483F-B678-EACC5503E90B}"/>
@@ -2973,10 +2973,34 @@
           <a:p>
             <a:pPr lvl="0"/>
             <a:r>
-              <a:rPr lang="en-US" sz="600" dirty="0" smtClean="0"/>
-              <a:t>UBSPROD\t608113 [printed: ____] [saved: May 20, 2019 5:06 PM] P:\Documents\Teaching\Day 1\Day 1.pptx </a:t>
-            </a:r>
-            <a:endParaRPr lang="en-US" sz="600" dirty="0" smtClean="0"/>
+              <a:rPr lang="de-CH" sz="600" dirty="0" smtClean="0"/>
+              <a:t>UBSPROD\</a:t>
+            </a:r>
+            <a:r>
+              <a:rPr lang="de-CH" sz="600" dirty="0" err="1" smtClean="0"/>
+              <a:t>hewitma</a:t>
+            </a:r>
+            <a:r>
+              <a:rPr lang="de-CH" sz="600" dirty="0" smtClean="0"/>
+              <a:t> [</a:t>
+            </a:r>
+            <a:r>
+              <a:rPr lang="de-CH" sz="600" dirty="0" err="1" smtClean="0"/>
+              <a:t>printed</a:t>
+            </a:r>
+            <a:r>
+              <a:rPr lang="de-CH" sz="600" dirty="0" smtClean="0"/>
+              <a:t>: ____] [</a:t>
+            </a:r>
+            <a:r>
+              <a:rPr lang="de-CH" sz="600" dirty="0" err="1" smtClean="0"/>
+              <a:t>saved</a:t>
+            </a:r>
+            <a:r>
+              <a:rPr lang="de-CH" sz="600" dirty="0" smtClean="0"/>
+              <a:t>: September 4, 2019 3:20 PM] C:\UBS\Dev\Projects\CodeRed-python-course\Day 1\Day 1.pptx </a:t>
+            </a:r>
+            <a:endParaRPr lang="de-CH" sz="600" dirty="0" smtClean="0"/>
           </a:p>
         </p:txBody>
       </p:sp>
@@ -4489,10 +4513,34 @@
           <a:p>
             <a:pPr lvl="0"/>
             <a:r>
-              <a:rPr lang="en-US" sz="600" dirty="0" smtClean="0"/>
-              <a:t>UBSPROD\t608113 [printed: ____] [saved: May 20, 2019 5:06 PM] P:\Documents\Teaching\Day 1\Day 1.pptx </a:t>
-            </a:r>
-            <a:endParaRPr lang="en-US" sz="600" dirty="0" smtClean="0"/>
+              <a:rPr lang="de-CH" sz="600" dirty="0" smtClean="0"/>
+              <a:t>UBSPROD\</a:t>
+            </a:r>
+            <a:r>
+              <a:rPr lang="de-CH" sz="600" dirty="0" err="1" smtClean="0"/>
+              <a:t>hewitma</a:t>
+            </a:r>
+            <a:r>
+              <a:rPr lang="de-CH" sz="600" dirty="0" smtClean="0"/>
+              <a:t> [</a:t>
+            </a:r>
+            <a:r>
+              <a:rPr lang="de-CH" sz="600" dirty="0" err="1" smtClean="0"/>
+              <a:t>printed</a:t>
+            </a:r>
+            <a:r>
+              <a:rPr lang="de-CH" sz="600" dirty="0" smtClean="0"/>
+              <a:t>: ____] [</a:t>
+            </a:r>
+            <a:r>
+              <a:rPr lang="de-CH" sz="600" dirty="0" err="1" smtClean="0"/>
+              <a:t>saved</a:t>
+            </a:r>
+            <a:r>
+              <a:rPr lang="de-CH" sz="600" dirty="0" smtClean="0"/>
+              <a:t>: September 4, 2019 3:20 PM] C:\UBS\Dev\Projects\CodeRed-python-course\Day 1\Day 1.pptx </a:t>
+            </a:r>
+            <a:endParaRPr lang="de-CH" sz="600" dirty="0" smtClean="0"/>
           </a:p>
         </p:txBody>
       </p:sp>
@@ -6005,10 +6053,34 @@
           <a:p>
             <a:pPr lvl="0"/>
             <a:r>
-              <a:rPr lang="en-US" sz="600" dirty="0" smtClean="0"/>
-              <a:t>UBSPROD\t608113 [printed: ____] [saved: May 20, 2019 5:06 PM] P:\Documents\Teaching\Day 1\Day 1.pptx </a:t>
-            </a:r>
-            <a:endParaRPr lang="en-US" sz="600" dirty="0" smtClean="0"/>
+              <a:rPr lang="de-CH" sz="600" dirty="0" smtClean="0"/>
+              <a:t>UBSPROD\</a:t>
+            </a:r>
+            <a:r>
+              <a:rPr lang="de-CH" sz="600" dirty="0" err="1" smtClean="0"/>
+              <a:t>hewitma</a:t>
+            </a:r>
+            <a:r>
+              <a:rPr lang="de-CH" sz="600" dirty="0" smtClean="0"/>
+              <a:t> [</a:t>
+            </a:r>
+            <a:r>
+              <a:rPr lang="de-CH" sz="600" dirty="0" err="1" smtClean="0"/>
+              <a:t>printed</a:t>
+            </a:r>
+            <a:r>
+              <a:rPr lang="de-CH" sz="600" dirty="0" smtClean="0"/>
+              <a:t>: ____] [</a:t>
+            </a:r>
+            <a:r>
+              <a:rPr lang="de-CH" sz="600" dirty="0" err="1" smtClean="0"/>
+              <a:t>saved</a:t>
+            </a:r>
+            <a:r>
+              <a:rPr lang="de-CH" sz="600" dirty="0" smtClean="0"/>
+              <a:t>: September 4, 2019 3:20 PM] C:\UBS\Dev\Projects\CodeRed-python-course\Day 1\Day 1.pptx </a:t>
+            </a:r>
+            <a:endParaRPr lang="de-CH" sz="600" dirty="0" smtClean="0"/>
           </a:p>
         </p:txBody>
       </p:sp>
@@ -8279,10 +8351,34 @@
           <a:p>
             <a:pPr lvl="0"/>
             <a:r>
-              <a:rPr lang="en-US" sz="600" dirty="0" smtClean="0"/>
-              <a:t>UBSPROD\t608113 [printed: ____] [saved: May 20, 2019 5:06 PM] P:\Documents\Teaching\Day 1\Day 1.pptx </a:t>
-            </a:r>
-            <a:endParaRPr lang="en-US" sz="600" dirty="0" smtClean="0"/>
+              <a:rPr lang="de-CH" sz="600" dirty="0" smtClean="0"/>
+              <a:t>UBSPROD\</a:t>
+            </a:r>
+            <a:r>
+              <a:rPr lang="de-CH" sz="600" dirty="0" err="1" smtClean="0"/>
+              <a:t>hewitma</a:t>
+            </a:r>
+            <a:r>
+              <a:rPr lang="de-CH" sz="600" dirty="0" smtClean="0"/>
+              <a:t> [</a:t>
+            </a:r>
+            <a:r>
+              <a:rPr lang="de-CH" sz="600" dirty="0" err="1" smtClean="0"/>
+              <a:t>printed</a:t>
+            </a:r>
+            <a:r>
+              <a:rPr lang="de-CH" sz="600" dirty="0" smtClean="0"/>
+              <a:t>: ____] [</a:t>
+            </a:r>
+            <a:r>
+              <a:rPr lang="de-CH" sz="600" dirty="0" err="1" smtClean="0"/>
+              <a:t>saved</a:t>
+            </a:r>
+            <a:r>
+              <a:rPr lang="de-CH" sz="600" dirty="0" smtClean="0"/>
+              <a:t>: September 4, 2019 3:20 PM] C:\UBS\Dev\Projects\CodeRed-python-course\Day 1\Day 1.pptx </a:t>
+            </a:r>
+            <a:endParaRPr lang="de-CH" sz="600" dirty="0" smtClean="0"/>
           </a:p>
         </p:txBody>
       </p:sp>
@@ -8997,10 +9093,34 @@
           <a:p>
             <a:pPr lvl="0"/>
             <a:r>
-              <a:rPr lang="en-US" sz="600" dirty="0" smtClean="0"/>
-              <a:t>UBSPROD\t608113 [printed: ____] [saved: May 20, 2019 5:06 PM] P:\Documents\Teaching\Day 1\Day 1.pptx </a:t>
-            </a:r>
-            <a:endParaRPr lang="en-US" sz="600" dirty="0" smtClean="0"/>
+              <a:rPr lang="de-CH" sz="600" dirty="0" smtClean="0"/>
+              <a:t>UBSPROD\</a:t>
+            </a:r>
+            <a:r>
+              <a:rPr lang="de-CH" sz="600" dirty="0" err="1" smtClean="0"/>
+              <a:t>hewitma</a:t>
+            </a:r>
+            <a:r>
+              <a:rPr lang="de-CH" sz="600" dirty="0" smtClean="0"/>
+              <a:t> [</a:t>
+            </a:r>
+            <a:r>
+              <a:rPr lang="de-CH" sz="600" dirty="0" err="1" smtClean="0"/>
+              <a:t>printed</a:t>
+            </a:r>
+            <a:r>
+              <a:rPr lang="de-CH" sz="600" dirty="0" smtClean="0"/>
+              <a:t>: ____] [</a:t>
+            </a:r>
+            <a:r>
+              <a:rPr lang="de-CH" sz="600" dirty="0" err="1" smtClean="0"/>
+              <a:t>saved</a:t>
+            </a:r>
+            <a:r>
+              <a:rPr lang="de-CH" sz="600" dirty="0" smtClean="0"/>
+              <a:t>: September 4, 2019 3:20 PM] C:\UBS\Dev\Projects\CodeRed-python-course\Day 1\Day 1.pptx </a:t>
+            </a:r>
+            <a:endParaRPr lang="de-CH" sz="600" dirty="0" smtClean="0"/>
           </a:p>
         </p:txBody>
       </p:sp>
@@ -9748,10 +9868,34 @@
           <a:p>
             <a:pPr lvl="0"/>
             <a:r>
-              <a:rPr lang="en-US" sz="600" dirty="0" smtClean="0"/>
-              <a:t>UBSPROD\t608113 [printed: ____] [saved: May 20, 2019 5:06 PM] P:\Documents\Teaching\Day 1\Day 1.pptx </a:t>
-            </a:r>
-            <a:endParaRPr lang="en-US" sz="600" dirty="0" smtClean="0"/>
+              <a:rPr lang="de-CH" sz="600" dirty="0" smtClean="0"/>
+              <a:t>UBSPROD\</a:t>
+            </a:r>
+            <a:r>
+              <a:rPr lang="de-CH" sz="600" dirty="0" err="1" smtClean="0"/>
+              <a:t>hewitma</a:t>
+            </a:r>
+            <a:r>
+              <a:rPr lang="de-CH" sz="600" dirty="0" smtClean="0"/>
+              <a:t> [</a:t>
+            </a:r>
+            <a:r>
+              <a:rPr lang="de-CH" sz="600" dirty="0" err="1" smtClean="0"/>
+              <a:t>printed</a:t>
+            </a:r>
+            <a:r>
+              <a:rPr lang="de-CH" sz="600" dirty="0" smtClean="0"/>
+              <a:t>: ____] [</a:t>
+            </a:r>
+            <a:r>
+              <a:rPr lang="de-CH" sz="600" dirty="0" err="1" smtClean="0"/>
+              <a:t>saved</a:t>
+            </a:r>
+            <a:r>
+              <a:rPr lang="de-CH" sz="600" dirty="0" smtClean="0"/>
+              <a:t>: September 4, 2019 3:20 PM] C:\UBS\Dev\Projects\CodeRed-python-course\Day 1\Day 1.pptx </a:t>
+            </a:r>
+            <a:endParaRPr lang="de-CH" sz="600" dirty="0" smtClean="0"/>
           </a:p>
         </p:txBody>
       </p:sp>
@@ -10802,10 +10946,34 @@
           <a:p>
             <a:pPr lvl="0"/>
             <a:r>
-              <a:rPr lang="en-US" sz="600" dirty="0" smtClean="0"/>
-              <a:t>UBSPROD\t608113 [printed: ____] [saved: May 20, 2019 5:06 PM] P:\Documents\Teaching\Day 1\Day 1.pptx </a:t>
-            </a:r>
-            <a:endParaRPr lang="en-US" sz="600" dirty="0" smtClean="0"/>
+              <a:rPr lang="de-CH" sz="600" dirty="0" smtClean="0"/>
+              <a:t>UBSPROD\</a:t>
+            </a:r>
+            <a:r>
+              <a:rPr lang="de-CH" sz="600" dirty="0" err="1" smtClean="0"/>
+              <a:t>hewitma</a:t>
+            </a:r>
+            <a:r>
+              <a:rPr lang="de-CH" sz="600" dirty="0" smtClean="0"/>
+              <a:t> [</a:t>
+            </a:r>
+            <a:r>
+              <a:rPr lang="de-CH" sz="600" dirty="0" err="1" smtClean="0"/>
+              <a:t>printed</a:t>
+            </a:r>
+            <a:r>
+              <a:rPr lang="de-CH" sz="600" dirty="0" smtClean="0"/>
+              <a:t>: ____] [</a:t>
+            </a:r>
+            <a:r>
+              <a:rPr lang="de-CH" sz="600" dirty="0" err="1" smtClean="0"/>
+              <a:t>saved</a:t>
+            </a:r>
+            <a:r>
+              <a:rPr lang="de-CH" sz="600" dirty="0" smtClean="0"/>
+              <a:t>: September 4, 2019 3:20 PM] C:\UBS\Dev\Projects\CodeRed-python-course\Day 1\Day 1.pptx </a:t>
+            </a:r>
+            <a:endParaRPr lang="de-CH" sz="600" dirty="0" smtClean="0"/>
           </a:p>
         </p:txBody>
       </p:sp>
@@ -11656,10 +11824,34 @@
           <a:p>
             <a:pPr lvl="0"/>
             <a:r>
-              <a:rPr lang="en-US" sz="600" dirty="0" smtClean="0"/>
-              <a:t>UBSPROD\t608113 [printed: ____] [saved: May 20, 2019 5:06 PM] P:\Documents\Teaching\Day 1\Day 1.pptx </a:t>
-            </a:r>
-            <a:endParaRPr lang="en-US" sz="600" dirty="0" smtClean="0"/>
+              <a:rPr lang="de-CH" sz="600" dirty="0" smtClean="0"/>
+              <a:t>UBSPROD\</a:t>
+            </a:r>
+            <a:r>
+              <a:rPr lang="de-CH" sz="600" dirty="0" err="1" smtClean="0"/>
+              <a:t>hewitma</a:t>
+            </a:r>
+            <a:r>
+              <a:rPr lang="de-CH" sz="600" dirty="0" smtClean="0"/>
+              <a:t> [</a:t>
+            </a:r>
+            <a:r>
+              <a:rPr lang="de-CH" sz="600" dirty="0" err="1" smtClean="0"/>
+              <a:t>printed</a:t>
+            </a:r>
+            <a:r>
+              <a:rPr lang="de-CH" sz="600" dirty="0" smtClean="0"/>
+              <a:t>: ____] [</a:t>
+            </a:r>
+            <a:r>
+              <a:rPr lang="de-CH" sz="600" dirty="0" err="1" smtClean="0"/>
+              <a:t>saved</a:t>
+            </a:r>
+            <a:r>
+              <a:rPr lang="de-CH" sz="600" dirty="0" smtClean="0"/>
+              <a:t>: September 4, 2019 3:20 PM] C:\UBS\Dev\Projects\CodeRed-python-course\Day 1\Day 1.pptx </a:t>
+            </a:r>
+            <a:endParaRPr lang="de-CH" sz="600" dirty="0" smtClean="0"/>
           </a:p>
         </p:txBody>
       </p:sp>
@@ -12412,10 +12604,34 @@
           <a:p>
             <a:pPr lvl="0"/>
             <a:r>
-              <a:rPr lang="en-US" sz="600" dirty="0" smtClean="0"/>
-              <a:t>UBSPROD\t608113 [printed: ____] [saved: May 20, 2019 5:06 PM] P:\Documents\Teaching\Day 1\Day 1.pptx </a:t>
-            </a:r>
-            <a:endParaRPr lang="en-US" sz="600" dirty="0" smtClean="0"/>
+              <a:rPr lang="de-CH" sz="600" dirty="0" smtClean="0"/>
+              <a:t>UBSPROD\</a:t>
+            </a:r>
+            <a:r>
+              <a:rPr lang="de-CH" sz="600" dirty="0" err="1" smtClean="0"/>
+              <a:t>hewitma</a:t>
+            </a:r>
+            <a:r>
+              <a:rPr lang="de-CH" sz="600" dirty="0" smtClean="0"/>
+              <a:t> [</a:t>
+            </a:r>
+            <a:r>
+              <a:rPr lang="de-CH" sz="600" dirty="0" err="1" smtClean="0"/>
+              <a:t>printed</a:t>
+            </a:r>
+            <a:r>
+              <a:rPr lang="de-CH" sz="600" dirty="0" smtClean="0"/>
+              <a:t>: ____] [</a:t>
+            </a:r>
+            <a:r>
+              <a:rPr lang="de-CH" sz="600" dirty="0" err="1" smtClean="0"/>
+              <a:t>saved</a:t>
+            </a:r>
+            <a:r>
+              <a:rPr lang="de-CH" sz="600" dirty="0" smtClean="0"/>
+              <a:t>: September 4, 2019 3:20 PM] C:\UBS\Dev\Projects\CodeRed-python-course\Day 1\Day 1.pptx </a:t>
+            </a:r>
+            <a:endParaRPr lang="de-CH" sz="600" dirty="0" smtClean="0"/>
           </a:p>
         </p:txBody>
       </p:sp>
@@ -13421,10 +13637,34 @@
           <a:p>
             <a:pPr lvl="0"/>
             <a:r>
-              <a:rPr lang="en-US" sz="600" dirty="0" smtClean="0"/>
-              <a:t>UBSPROD\t608113 [printed: ____] [saved: May 20, 2019 5:06 PM] P:\Documents\Teaching\Day 1\Day 1.pptx </a:t>
-            </a:r>
-            <a:endParaRPr lang="en-US" sz="600" dirty="0" smtClean="0"/>
+              <a:rPr lang="de-CH" sz="600" dirty="0" smtClean="0"/>
+              <a:t>UBSPROD\</a:t>
+            </a:r>
+            <a:r>
+              <a:rPr lang="de-CH" sz="600" dirty="0" err="1" smtClean="0"/>
+              <a:t>hewitma</a:t>
+            </a:r>
+            <a:r>
+              <a:rPr lang="de-CH" sz="600" dirty="0" smtClean="0"/>
+              <a:t> [</a:t>
+            </a:r>
+            <a:r>
+              <a:rPr lang="de-CH" sz="600" dirty="0" err="1" smtClean="0"/>
+              <a:t>printed</a:t>
+            </a:r>
+            <a:r>
+              <a:rPr lang="de-CH" sz="600" dirty="0" smtClean="0"/>
+              <a:t>: ____] [</a:t>
+            </a:r>
+            <a:r>
+              <a:rPr lang="de-CH" sz="600" dirty="0" err="1" smtClean="0"/>
+              <a:t>saved</a:t>
+            </a:r>
+            <a:r>
+              <a:rPr lang="de-CH" sz="600" dirty="0" smtClean="0"/>
+              <a:t>: September 4, 2019 3:20 PM] C:\UBS\Dev\Projects\CodeRed-python-course\Day 1\Day 1.pptx </a:t>
+            </a:r>
+            <a:endParaRPr lang="de-CH" sz="600" dirty="0" smtClean="0"/>
           </a:p>
         </p:txBody>
       </p:sp>
@@ -14683,10 +14923,34 @@
           <a:p>
             <a:pPr lvl="0"/>
             <a:r>
-              <a:rPr lang="en-US" sz="600" dirty="0" smtClean="0"/>
-              <a:t>UBSPROD\t608113 [printed: ____] [saved: May 20, 2019 5:06 PM] P:\Documents\Teaching\Day 1\Day 1.pptx </a:t>
-            </a:r>
-            <a:endParaRPr lang="en-US" sz="600" dirty="0" smtClean="0"/>
+              <a:rPr lang="de-CH" sz="600" dirty="0" smtClean="0"/>
+              <a:t>UBSPROD\</a:t>
+            </a:r>
+            <a:r>
+              <a:rPr lang="de-CH" sz="600" dirty="0" err="1" smtClean="0"/>
+              <a:t>hewitma</a:t>
+            </a:r>
+            <a:r>
+              <a:rPr lang="de-CH" sz="600" dirty="0" smtClean="0"/>
+              <a:t> [</a:t>
+            </a:r>
+            <a:r>
+              <a:rPr lang="de-CH" sz="600" dirty="0" err="1" smtClean="0"/>
+              <a:t>printed</a:t>
+            </a:r>
+            <a:r>
+              <a:rPr lang="de-CH" sz="600" dirty="0" smtClean="0"/>
+              <a:t>: ____] [</a:t>
+            </a:r>
+            <a:r>
+              <a:rPr lang="de-CH" sz="600" dirty="0" err="1" smtClean="0"/>
+              <a:t>saved</a:t>
+            </a:r>
+            <a:r>
+              <a:rPr lang="de-CH" sz="600" dirty="0" smtClean="0"/>
+              <a:t>: September 4, 2019 3:20 PM] C:\UBS\Dev\Projects\CodeRed-python-course\Day 1\Day 1.pptx </a:t>
+            </a:r>
+            <a:endParaRPr lang="de-CH" sz="600" dirty="0" smtClean="0"/>
           </a:p>
         </p:txBody>
       </p:sp>
@@ -15947,10 +16211,34 @@
           <a:p>
             <a:pPr lvl="0"/>
             <a:r>
-              <a:rPr lang="en-US" sz="600" dirty="0" smtClean="0"/>
-              <a:t>UBSPROD\t608113 [printed: ____] [saved: May 20, 2019 5:06 PM] P:\Documents\Teaching\Day 1\Day 1.pptx </a:t>
-            </a:r>
-            <a:endParaRPr lang="en-US" sz="600" dirty="0" smtClean="0"/>
+              <a:rPr lang="de-CH" sz="600" dirty="0" smtClean="0"/>
+              <a:t>UBSPROD\</a:t>
+            </a:r>
+            <a:r>
+              <a:rPr lang="de-CH" sz="600" dirty="0" err="1" smtClean="0"/>
+              <a:t>hewitma</a:t>
+            </a:r>
+            <a:r>
+              <a:rPr lang="de-CH" sz="600" dirty="0" smtClean="0"/>
+              <a:t> [</a:t>
+            </a:r>
+            <a:r>
+              <a:rPr lang="de-CH" sz="600" dirty="0" err="1" smtClean="0"/>
+              <a:t>printed</a:t>
+            </a:r>
+            <a:r>
+              <a:rPr lang="de-CH" sz="600" dirty="0" smtClean="0"/>
+              <a:t>: ____] [</a:t>
+            </a:r>
+            <a:r>
+              <a:rPr lang="de-CH" sz="600" dirty="0" err="1" smtClean="0"/>
+              <a:t>saved</a:t>
+            </a:r>
+            <a:r>
+              <a:rPr lang="de-CH" sz="600" dirty="0" smtClean="0"/>
+              <a:t>: September 4, 2019 3:20 PM] C:\UBS\Dev\Projects\CodeRed-python-course\Day 1\Day 1.pptx </a:t>
+            </a:r>
+            <a:endParaRPr lang="de-CH" sz="600" dirty="0" smtClean="0"/>
           </a:p>
         </p:txBody>
       </p:sp>
@@ -17465,10 +17753,34 @@
           <a:p>
             <a:pPr lvl="0"/>
             <a:r>
-              <a:rPr lang="en-US" sz="600" dirty="0" smtClean="0"/>
-              <a:t>UBSPROD\t608113 [printed: ____] [saved: May 20, 2019 5:06 PM] P:\Documents\Teaching\Day 1\Day 1.pptx </a:t>
-            </a:r>
-            <a:endParaRPr lang="en-US" sz="600" dirty="0" smtClean="0"/>
+              <a:rPr lang="de-CH" sz="600" dirty="0" smtClean="0"/>
+              <a:t>UBSPROD\</a:t>
+            </a:r>
+            <a:r>
+              <a:rPr lang="de-CH" sz="600" dirty="0" err="1" smtClean="0"/>
+              <a:t>hewitma</a:t>
+            </a:r>
+            <a:r>
+              <a:rPr lang="de-CH" sz="600" dirty="0" smtClean="0"/>
+              <a:t> [</a:t>
+            </a:r>
+            <a:r>
+              <a:rPr lang="de-CH" sz="600" dirty="0" err="1" smtClean="0"/>
+              <a:t>printed</a:t>
+            </a:r>
+            <a:r>
+              <a:rPr lang="de-CH" sz="600" dirty="0" smtClean="0"/>
+              <a:t>: ____] [</a:t>
+            </a:r>
+            <a:r>
+              <a:rPr lang="de-CH" sz="600" dirty="0" err="1" smtClean="0"/>
+              <a:t>saved</a:t>
+            </a:r>
+            <a:r>
+              <a:rPr lang="de-CH" sz="600" dirty="0" smtClean="0"/>
+              <a:t>: September 4, 2019 3:20 PM] C:\UBS\Dev\Projects\CodeRed-python-course\Day 1\Day 1.pptx </a:t>
+            </a:r>
+            <a:endParaRPr lang="de-CH" sz="600" dirty="0" smtClean="0"/>
           </a:p>
         </p:txBody>
       </p:sp>
@@ -19026,11 +19338,7 @@
             </a:pPr>
             <a:r>
               <a:rPr lang="en-US" dirty="0" smtClean="0"/>
-              <a:t>		print("Hello World 10 times</a:t>
-            </a:r>
-            <a:r>
-              <a:rPr lang="en-US" dirty="0" smtClean="0"/>
-              <a:t>")</a:t>
+              <a:t>		print("Hello World 10 times")</a:t>
             </a:r>
           </a:p>
           <a:p>
@@ -19058,7 +19366,6 @@
               <a:rPr lang="en-US" dirty="0" smtClean="0"/>
               <a:t>     print("world")</a:t>
             </a:r>
-            <a:endParaRPr lang="en-US" dirty="0" smtClean="0"/>
           </a:p>
           <a:p>
             <a:pPr lvl="2"/>
@@ -19236,8 +19543,8 @@
         </p:nvSpPr>
         <p:spPr>
           <a:xfrm>
-            <a:off x="560567" y="1320801"/>
-            <a:ext cx="7502119" cy="5291138"/>
+            <a:off x="523875" y="1320801"/>
+            <a:ext cx="7538811" cy="5139033"/>
           </a:xfrm>
         </p:spPr>
         <p:txBody>
@@ -19767,7 +20074,23 @@
           <a:p>
             <a:r>
               <a:rPr lang="en-US" altLang="en-US" dirty="0"/>
-              <a:t>“Tried and true” language that has been in development since 1991</a:t>
+              <a:t>"</a:t>
+            </a:r>
+            <a:r>
+              <a:rPr lang="en-US" altLang="en-US" dirty="0" smtClean="0"/>
+              <a:t>Tried </a:t>
+            </a:r>
+            <a:r>
+              <a:rPr lang="en-US" altLang="en-US" dirty="0"/>
+              <a:t>and </a:t>
+            </a:r>
+            <a:r>
+              <a:rPr lang="en-US" altLang="en-US" dirty="0" smtClean="0"/>
+              <a:t>true" </a:t>
+            </a:r>
+            <a:r>
+              <a:rPr lang="en-US" altLang="en-US" dirty="0"/>
+              <a:t>language that has been in development since 1991</a:t>
             </a:r>
           </a:p>
           <a:p>
@@ -20071,15 +20394,7 @@
             </a:r>
             <a:r>
               <a:rPr lang="en-US" altLang="en-US" i="1" dirty="0" smtClean="0"/>
-              <a:t>byte-</a:t>
-            </a:r>
-            <a:r>
-              <a:rPr lang="en-US" altLang="en-US" i="1" dirty="0" smtClean="0"/>
-              <a:t>code </a:t>
-            </a:r>
-            <a:r>
-              <a:rPr lang="en-US" altLang="en-US" i="1" dirty="0" smtClean="0"/>
-              <a:t>interpreted </a:t>
+              <a:t>byte-code interpreted </a:t>
             </a:r>
             <a:r>
               <a:rPr lang="en-US" altLang="en-US" dirty="0" smtClean="0"/>
@@ -26771,7 +27086,7 @@
   <a:extraClrSchemeLst/>
   <a:extLst>
     <a:ext uri="{05A4C25C-085E-4340-85A3-A5531E510DB2}">
-      <thm15:themeFamily xmlns:thm15="http://schemas.microsoft.com/office/thememl/2012/main" xmlns="" name="PresPrintOnScreen.potx" id="{B1CF8AA8-D6A7-41EF-9E90-0F39E6846CD9}" vid="{374E0768-1711-4036-89AA-A65302BE1F55}"/>
+      <thm15:themeFamily xmlns="" xmlns:thm15="http://schemas.microsoft.com/office/thememl/2012/main" name="PresPrintOnScreen.potx" id="{B1CF8AA8-D6A7-41EF-9E90-0F39E6846CD9}" vid="{374E0768-1711-4036-89AA-A65302BE1F55}"/>
     </a:ext>
   </a:extLst>
 </a:theme>

</xml_diff>